<commit_message>
shuffle title for economic display
</commit_message>
<xml_diff>
--- a/slides.pptx
+++ b/slides.pptx
@@ -3139,7 +3139,7 @@
             </a:pPr>
             <a:r>
               <a:rPr/>
-              <a:t>Unleashing Ollscoil na Gaillimhe / University of Galway’s Research Data Into the Future</a:t>
+              <a:t>Unleashing Research Data Into the Future</a:t>
             </a:r>
           </a:p>
         </p:txBody>
@@ -3167,6 +3167,10 @@
             <a:pPr lvl="0" indent="0" marL="0">
               <a:buNone/>
             </a:pPr>
+            <a:r>
+              <a:rPr/>
+              <a:t>at the Ollscoil na Gaillimhe / University of Galway</a:t>
+            </a:r>
             <a:br/>
             <a:br/>
             <a:r>

</xml_diff>